<commit_message>
Add secret providers to services
</commit_message>
<xml_diff>
--- a/docs/Office_Docs/Sprint_3.pptx
+++ b/docs/Office_Docs/Sprint_3.pptx
@@ -3478,8 +3478,12 @@
           <a:lstStyle/>
           <a:p>
             <a:r>
+              <a:rPr lang="en-GB"/>
+              <a:t>Sprint 3 </a:t>
+            </a:r>
+            <a:r>
               <a:rPr lang="en-GB" dirty="0"/>
-              <a:t>Sprint 2 delivery</a:t>
+              <a:t>delivery</a:t>
             </a:r>
             <a:endParaRPr lang="en-NL" dirty="0"/>
           </a:p>
@@ -3874,18 +3878,9 @@
           </a:p>
           <a:p>
             <a:r>
-              <a:rPr lang="en-GB"/>
-              <a:t>Continue with OSI </a:t>
-            </a:r>
-            <a:r>
               <a:rPr lang="en-GB" dirty="0"/>
-              <a:t>Layer </a:t>
-            </a:r>
-            <a:r>
-              <a:rPr lang="en-GB"/>
-              <a:t>7 security</a:t>
-            </a:r>
-            <a:endParaRPr lang="en-GB" dirty="0"/>
+              <a:t>Continue with OSI Layer 7 security implementation</a:t>
+            </a:r>
           </a:p>
           <a:p>
             <a:endParaRPr lang="en-GB" dirty="0"/>

</xml_diff>